<commit_message>
adding description to model
</commit_message>
<xml_diff>
--- a/poster.pptx
+++ b/poster.pptx
@@ -3978,7 +3978,7 @@
               <a:graphicData uri="http://schemas.openxmlformats.org/presentationml/2006/ole">
                 <mc:AlternateContent xmlns:mc="http://schemas.openxmlformats.org/markup-compatibility/2006">
                   <mc:Choice xmlns:v="urn:schemas-microsoft-com:vml" Requires="v">
-                    <p:oleObj spid="_x0000_s1117" name="Image" r:id="rId8" imgW="1828440" imgH="1117440" progId="Photoshop.Image.13">
+                    <p:oleObj spid="_x0000_s1130" name="Image" r:id="rId8" imgW="1828440" imgH="1117440" progId="Photoshop.Image.13">
                       <p:embed/>
                     </p:oleObj>
                   </mc:Choice>
@@ -4035,7 +4035,7 @@
               <a:graphicData uri="http://schemas.openxmlformats.org/presentationml/2006/ole">
                 <mc:AlternateContent xmlns:mc="http://schemas.openxmlformats.org/markup-compatibility/2006">
                   <mc:Choice xmlns:v="urn:schemas-microsoft-com:vml" Requires="v">
-                    <p:oleObj spid="_x0000_s1118" name="Image" r:id="rId10" imgW="1828440" imgH="1117440" progId="Photoshop.Image.13">
+                    <p:oleObj spid="_x0000_s1131" name="Image" r:id="rId10" imgW="1828440" imgH="1117440" progId="Photoshop.Image.13">
                       <p:embed/>
                     </p:oleObj>
                   </mc:Choice>
@@ -5218,7 +5218,7 @@
             <a:graphicData uri="http://schemas.openxmlformats.org/presentationml/2006/ole">
               <mc:AlternateContent xmlns:mc="http://schemas.openxmlformats.org/markup-compatibility/2006">
                 <mc:Choice xmlns:v="urn:schemas-microsoft-com:vml" Requires="v">
-                  <p:oleObj spid="_x0000_s1119" name="Image" r:id="rId12" imgW="4571280" imgH="1688760" progId="Photoshop.Image.13">
+                  <p:oleObj spid="_x0000_s1132" name="Image" r:id="rId12" imgW="4571280" imgH="1688760" progId="Photoshop.Image.13">
                     <p:embed/>
                   </p:oleObj>
                 </mc:Choice>
@@ -5302,7 +5302,7 @@
             <a:graphicData uri="http://schemas.openxmlformats.org/presentationml/2006/ole">
               <mc:AlternateContent xmlns:mc="http://schemas.openxmlformats.org/markup-compatibility/2006">
                 <mc:Choice xmlns:v="urn:schemas-microsoft-com:vml" Requires="v">
-                  <p:oleObj spid="_x0000_s1120" name="Image" r:id="rId15" imgW="1574280" imgH="1053720" progId="Photoshop.Image.13">
+                  <p:oleObj spid="_x0000_s1133" name="Image" r:id="rId15" imgW="1574280" imgH="1053720" progId="Photoshop.Image.13">
                     <p:embed/>
                   </p:oleObj>
                 </mc:Choice>
@@ -7311,7 +7311,7 @@
               <a:graphicData uri="http://schemas.openxmlformats.org/presentationml/2006/ole">
                 <mc:AlternateContent xmlns:mc="http://schemas.openxmlformats.org/markup-compatibility/2006">
                   <mc:Choice xmlns:v="urn:schemas-microsoft-com:vml" Requires="v">
-                    <p:oleObj spid="_x0000_s2141" name="Image" r:id="rId8" imgW="1828440" imgH="1117440" progId="Photoshop.Image.13">
+                    <p:oleObj spid="_x0000_s2154" name="Image" r:id="rId8" imgW="1828440" imgH="1117440" progId="Photoshop.Image.13">
                       <p:embed/>
                     </p:oleObj>
                   </mc:Choice>
@@ -7368,7 +7368,7 @@
               <a:graphicData uri="http://schemas.openxmlformats.org/presentationml/2006/ole">
                 <mc:AlternateContent xmlns:mc="http://schemas.openxmlformats.org/markup-compatibility/2006">
                   <mc:Choice xmlns:v="urn:schemas-microsoft-com:vml" Requires="v">
-                    <p:oleObj spid="_x0000_s2142" name="Image" r:id="rId10" imgW="1828440" imgH="1117440" progId="Photoshop.Image.13">
+                    <p:oleObj spid="_x0000_s2155" name="Image" r:id="rId10" imgW="1828440" imgH="1117440" progId="Photoshop.Image.13">
                       <p:embed/>
                     </p:oleObj>
                   </mc:Choice>
@@ -8551,7 +8551,7 @@
             <a:graphicData uri="http://schemas.openxmlformats.org/presentationml/2006/ole">
               <mc:AlternateContent xmlns:mc="http://schemas.openxmlformats.org/markup-compatibility/2006">
                 <mc:Choice xmlns:v="urn:schemas-microsoft-com:vml" Requires="v">
-                  <p:oleObj spid="_x0000_s2143" name="Image" r:id="rId12" imgW="4571280" imgH="1688760" progId="Photoshop.Image.13">
+                  <p:oleObj spid="_x0000_s2156" name="Image" r:id="rId12" imgW="4571280" imgH="1688760" progId="Photoshop.Image.13">
                     <p:embed/>
                   </p:oleObj>
                 </mc:Choice>
@@ -8635,7 +8635,7 @@
             <a:graphicData uri="http://schemas.openxmlformats.org/presentationml/2006/ole">
               <mc:AlternateContent xmlns:mc="http://schemas.openxmlformats.org/markup-compatibility/2006">
                 <mc:Choice xmlns:v="urn:schemas-microsoft-com:vml" Requires="v">
-                  <p:oleObj spid="_x0000_s2144" name="Image" r:id="rId15" imgW="1574280" imgH="1053720" progId="Photoshop.Image.13">
+                  <p:oleObj spid="_x0000_s2157" name="Image" r:id="rId15" imgW="1574280" imgH="1053720" progId="Photoshop.Image.13">
                     <p:embed/>
                   </p:oleObj>
                 </mc:Choice>
@@ -9463,7 +9463,11 @@
           <a:p>
             <a:pPr algn="just"/>
             <a:r>
-              <a:rPr lang="en-US" dirty="0"/>
+              <a:rPr lang="en-US" dirty="0">
+                <a:solidFill>
+                  <a:schemeClr val="tx1"/>
+                </a:solidFill>
+              </a:rPr>
               <a:t>The Visual Dialog task has been at the forefront of deep learning research and excellent performance has already been achieved. Visual Dialog is about training a network to learn information about images, and be able to answer questions and have a conversation about those images. It involves being able to encode the relevant information (such as the images, the captions for the images, and the questions and answers about the images) into a meaningful representation, as well as being able to decode that representation and come out with a correct answer. In our project, we attempt to first reproduce the state-of-the-art method using the widely used Visual Dialog dataset, which outperforms many other sophisticated baselines. This method uses a Late Fusion encoder with a discriminative decoder.  We also decrease the model size and still obtain comparable results by using an attention mechanism. Finally, we attempt to propose a new algorithm for further improvements and outperform the existing methods.</a:t>
             </a:r>
           </a:p>
@@ -9504,7 +9508,7 @@
         </p:nvSpPr>
         <p:spPr>
           <a:xfrm>
-            <a:off x="565119" y="9738626"/>
+            <a:off x="572182" y="9616503"/>
             <a:ext cx="12949224" cy="643172"/>
           </a:xfrm>
         </p:spPr>
@@ -9516,7 +9520,6 @@
               <a:rPr lang="en-US" dirty="0" smtClean="0"/>
               <a:t>Models</a:t>
             </a:r>
-            <a:endParaRPr lang="en-US" dirty="0" smtClean="0"/>
           </a:p>
         </p:txBody>
       </p:sp>
@@ -9564,24 +9567,44 @@
           <a:lstStyle/>
           <a:p>
             <a:r>
-              <a:rPr lang="en-US" b="1" dirty="0" smtClean="0"/>
+              <a:rPr lang="en-US" b="1" dirty="0" smtClean="0">
+                <a:solidFill>
+                  <a:schemeClr val="tx1"/>
+                </a:solidFill>
+              </a:rPr>
               <a:t>Evaluation</a:t>
             </a:r>
             <a:r>
-              <a:rPr lang="en-US" dirty="0" smtClean="0"/>
+              <a:rPr lang="en-US" dirty="0" smtClean="0">
+                <a:solidFill>
+                  <a:schemeClr val="tx1"/>
+                </a:solidFill>
+              </a:rPr>
               <a:t>: We conduct the experiments on the retrieval task, which is evaluated with Mean Reciprocal Rank (MRR) and Recall at N (R@N).</a:t>
             </a:r>
           </a:p>
           <a:p>
             <a:r>
-              <a:rPr lang="en-US" b="1" dirty="0" smtClean="0"/>
+              <a:rPr lang="en-US" b="1" dirty="0" smtClean="0">
+                <a:solidFill>
+                  <a:schemeClr val="tx1"/>
+                </a:solidFill>
+              </a:rPr>
               <a:t>Limitation</a:t>
             </a:r>
             <a:r>
-              <a:rPr lang="en-US" dirty="0" smtClean="0"/>
+              <a:rPr lang="en-US" dirty="0" smtClean="0">
+                <a:solidFill>
+                  <a:schemeClr val="tx1"/>
+                </a:solidFill>
+              </a:rPr>
               <a:t>: Due to hardware constraints, we use smaller hidden size (200) and word embedding size (200) as opposed to 512 and 300 in Das et al.. We are able to get results that are close to what were reported by the authors.</a:t>
             </a:r>
-            <a:endParaRPr lang="en-US" dirty="0"/>
+            <a:endParaRPr lang="en-US" dirty="0">
+              <a:solidFill>
+                <a:schemeClr val="tx1"/>
+              </a:solidFill>
+            </a:endParaRPr>
           </a:p>
         </p:txBody>
       </p:sp>
@@ -9724,7 +9747,7 @@
         </p:nvSpPr>
         <p:spPr>
           <a:xfrm>
-            <a:off x="614329" y="10735310"/>
+            <a:off x="614328" y="10103878"/>
             <a:ext cx="12957406" cy="1393252"/>
           </a:xfrm>
         </p:spPr>
@@ -9733,26 +9756,50 @@
           <a:lstStyle/>
           <a:p>
             <a:r>
-              <a:rPr lang="en-US" dirty="0" smtClean="0"/>
+              <a:rPr lang="en-US" dirty="0" smtClean="0">
+                <a:solidFill>
+                  <a:schemeClr val="tx1"/>
+                </a:solidFill>
+              </a:rPr>
               <a:t>In this project, we introduce a family of neural encoder-decoder models for Visual Dialog with 2 encoders </a:t>
             </a:r>
             <a:r>
-              <a:rPr lang="mr-IN" dirty="0" smtClean="0"/>
+              <a:rPr lang="mr-IN" dirty="0" smtClean="0">
+                <a:solidFill>
+                  <a:schemeClr val="tx1"/>
+                </a:solidFill>
+              </a:rPr>
               <a:t>–</a:t>
             </a:r>
             <a:r>
-              <a:rPr lang="en-US" dirty="0" smtClean="0"/>
+              <a:rPr lang="en-US" dirty="0" smtClean="0">
+                <a:solidFill>
+                  <a:schemeClr val="tx1"/>
+                </a:solidFill>
+              </a:rPr>
               <a:t> Late Fusion, Sequential Matching </a:t>
             </a:r>
             <a:r>
-              <a:rPr lang="mr-IN" dirty="0" smtClean="0"/>
+              <a:rPr lang="mr-IN" dirty="0" smtClean="0">
+                <a:solidFill>
+                  <a:schemeClr val="tx1"/>
+                </a:solidFill>
+              </a:rPr>
               <a:t>–</a:t>
             </a:r>
             <a:r>
-              <a:rPr lang="en-US" dirty="0" smtClean="0"/>
+              <a:rPr lang="en-US" dirty="0" smtClean="0">
+                <a:solidFill>
+                  <a:schemeClr val="tx1"/>
+                </a:solidFill>
+              </a:rPr>
               <a:t> and 2 decoders (generative and discriminative), which are comparable to a number of sophisticated baselines.</a:t>
             </a:r>
-            <a:endParaRPr lang="en-US" dirty="0"/>
+            <a:endParaRPr lang="en-US" dirty="0">
+              <a:solidFill>
+                <a:schemeClr val="tx1"/>
+              </a:solidFill>
+            </a:endParaRPr>
           </a:p>
         </p:txBody>
       </p:sp>
@@ -10189,75 +10236,143 @@
           </a:lstStyle>
           <a:p>
             <a:r>
-              <a:rPr lang="en-US" dirty="0"/>
+              <a:rPr lang="en-US" dirty="0">
+                <a:solidFill>
+                  <a:schemeClr val="tx1"/>
+                </a:solidFill>
+              </a:rPr>
               <a:t>Our Visual Dialog system involves in deep learning approaches such as CNNs and RNNs with </a:t>
             </a:r>
             <a:r>
-              <a:rPr lang="en-US" dirty="0" smtClean="0"/>
+              <a:rPr lang="en-US" dirty="0" smtClean="0">
+                <a:solidFill>
+                  <a:schemeClr val="tx1"/>
+                </a:solidFill>
+              </a:rPr>
               <a:t>attention </a:t>
             </a:r>
             <a:r>
-              <a:rPr lang="en-US" dirty="0"/>
+              <a:rPr lang="en-US" dirty="0">
+                <a:solidFill>
+                  <a:schemeClr val="tx1"/>
+                </a:solidFill>
+              </a:rPr>
               <a:t>to better understanding the images and questions. Therefore, also based on literature research, we decide to deploy the network based on </a:t>
             </a:r>
             <a:r>
-              <a:rPr lang="en-US" dirty="0" err="1"/>
+              <a:rPr lang="en-US" dirty="0" err="1">
+                <a:solidFill>
+                  <a:schemeClr val="tx1"/>
+                </a:solidFill>
+              </a:rPr>
               <a:t>Pytorch</a:t>
             </a:r>
             <a:r>
-              <a:rPr lang="en-US" dirty="0"/>
+              <a:rPr lang="en-US" dirty="0">
+                <a:solidFill>
+                  <a:schemeClr val="tx1"/>
+                </a:solidFill>
+              </a:rPr>
               <a:t> with GPUs on Amazon Web Service. </a:t>
             </a:r>
           </a:p>
           <a:p>
             <a:r>
-              <a:rPr lang="en-US" dirty="0"/>
+              <a:rPr lang="en-US" dirty="0">
+                <a:solidFill>
+                  <a:schemeClr val="tx1"/>
+                </a:solidFill>
+              </a:rPr>
               <a:t>In this project, we use </a:t>
             </a:r>
             <a:r>
-              <a:rPr lang="en-US" dirty="0" err="1"/>
+              <a:rPr lang="en-US" dirty="0" err="1">
+                <a:solidFill>
+                  <a:schemeClr val="tx1"/>
+                </a:solidFill>
+              </a:rPr>
               <a:t>VisDial</a:t>
             </a:r>
             <a:r>
-              <a:rPr lang="en-US" dirty="0"/>
+              <a:rPr lang="en-US" dirty="0">
+                <a:solidFill>
+                  <a:schemeClr val="tx1"/>
+                </a:solidFill>
+              </a:rPr>
               <a:t> v0.9 dataset, which contains 83k dialogs on COCO-train and 40K on COCO-</a:t>
             </a:r>
             <a:r>
-              <a:rPr lang="en-US" dirty="0" err="1"/>
+              <a:rPr lang="en-US" dirty="0" err="1">
+                <a:solidFill>
+                  <a:schemeClr val="tx1"/>
+                </a:solidFill>
+              </a:rPr>
               <a:t>val</a:t>
             </a:r>
             <a:r>
-              <a:rPr lang="en-US" dirty="0"/>
+              <a:rPr lang="en-US" dirty="0">
+                <a:solidFill>
+                  <a:schemeClr val="tx1"/>
+                </a:solidFill>
+              </a:rPr>
               <a:t> images. We use the 83k as training and split the 40K into 5k for validation and 35k for test. </a:t>
             </a:r>
           </a:p>
           <a:p>
             <a:r>
-              <a:rPr lang="en-US" dirty="0"/>
+              <a:rPr lang="en-US" dirty="0">
+                <a:solidFill>
+                  <a:schemeClr val="tx1"/>
+                </a:solidFill>
+              </a:rPr>
               <a:t>Our work is based on </a:t>
             </a:r>
             <a:r>
-              <a:rPr lang="en-US" dirty="0" err="1"/>
+              <a:rPr lang="en-US" dirty="0" err="1">
+                <a:solidFill>
+                  <a:schemeClr val="tx1"/>
+                </a:solidFill>
+              </a:rPr>
               <a:t>Pytorch</a:t>
             </a:r>
             <a:r>
-              <a:rPr lang="en-US" dirty="0"/>
+              <a:rPr lang="en-US" dirty="0">
+                <a:solidFill>
+                  <a:schemeClr val="tx1"/>
+                </a:solidFill>
+              </a:rPr>
               <a:t>, due to GPU memory limitation, we reduce the size of hidden layer in </a:t>
             </a:r>
             <a:r>
-              <a:rPr lang="en-US" dirty="0" err="1"/>
+              <a:rPr lang="en-US" dirty="0" err="1">
+                <a:solidFill>
+                  <a:schemeClr val="tx1"/>
+                </a:solidFill>
+              </a:rPr>
               <a:t>GRUCell</a:t>
             </a:r>
             <a:r>
-              <a:rPr lang="en-US" dirty="0"/>
+              <a:rPr lang="en-US" dirty="0">
+                <a:solidFill>
+                  <a:schemeClr val="tx1"/>
+                </a:solidFill>
+              </a:rPr>
               <a:t>, aiming to produce the same comparable results with less parameters and further </a:t>
             </a:r>
             <a:r>
-              <a:rPr lang="en-US" dirty="0" smtClean="0"/>
+              <a:rPr lang="en-US" dirty="0" smtClean="0">
+                <a:solidFill>
+                  <a:schemeClr val="tx1"/>
+                </a:solidFill>
+              </a:rPr>
               <a:t>improvements</a:t>
             </a:r>
             <a:r>
-              <a:rPr lang="en-US" dirty="0"/>
+              <a:rPr lang="en-US" dirty="0">
+                <a:solidFill>
+                  <a:schemeClr val="tx1"/>
+                </a:solidFill>
+              </a:rPr>
               <a:t>. </a:t>
             </a:r>
           </a:p>
@@ -10638,15 +10753,7 @@
             </a:r>
             <a:r>
               <a:rPr lang="en-US" dirty="0" smtClean="0"/>
-              <a:t>, </a:t>
-            </a:r>
-            <a:r>
-              <a:rPr lang="en-US" dirty="0" smtClean="0"/>
-              <a:t>CIT</a:t>
-            </a:r>
-            <a:r>
-              <a:rPr lang="en-US" dirty="0" smtClean="0"/>
-              <a:t>, </a:t>
+              <a:t>, CIT, </a:t>
             </a:r>
             <a:r>
               <a:rPr lang="en-US" dirty="0"/>
@@ -10654,11 +10761,7 @@
             </a:r>
             <a:r>
               <a:rPr lang="en-US" dirty="0" smtClean="0"/>
-              <a:t>CE</a:t>
-            </a:r>
-            <a:r>
-              <a:rPr lang="en-US" dirty="0" smtClean="0"/>
-              <a:t>, </a:t>
+              <a:t>CE, </a:t>
             </a:r>
             <a:r>
               <a:rPr lang="en-US" dirty="0" smtClean="0">
@@ -11258,7 +11361,7 @@
         </p:blipFill>
         <p:spPr>
           <a:xfrm>
-            <a:off x="2018952" y="13194858"/>
+            <a:off x="2018950" y="12222780"/>
             <a:ext cx="9982559" cy="3335433"/>
           </a:xfrm>
           <a:prstGeom prst="rect">
@@ -11276,7 +11379,7 @@
         </p:nvSpPr>
         <p:spPr>
           <a:xfrm>
-            <a:off x="535621" y="12340124"/>
+            <a:off x="535618" y="11429675"/>
             <a:ext cx="12949224" cy="643172"/>
           </a:xfrm>
           <a:prstGeom prst="rect">
@@ -11430,15 +11533,7 @@
           <a:p>
             <a:r>
               <a:rPr lang="en-US" b="0" dirty="0" smtClean="0"/>
-              <a:t>Late </a:t>
-            </a:r>
-            <a:r>
-              <a:rPr lang="en-US" b="0" dirty="0" smtClean="0"/>
-              <a:t>Fusion </a:t>
-            </a:r>
-            <a:r>
-              <a:rPr lang="en-US" b="0" dirty="0" smtClean="0"/>
-              <a:t>- Discriminative</a:t>
+              <a:t>Late Fusion - Discriminative</a:t>
             </a:r>
           </a:p>
         </p:txBody>
@@ -11453,7 +11548,7 @@
         </p:nvSpPr>
         <p:spPr>
           <a:xfrm>
-            <a:off x="535621" y="18494227"/>
+            <a:off x="535618" y="17684427"/>
             <a:ext cx="12949224" cy="643172"/>
           </a:xfrm>
           <a:prstGeom prst="rect">
@@ -11622,7 +11717,7 @@
         </p:nvSpPr>
         <p:spPr>
           <a:xfrm>
-            <a:off x="576461" y="24777687"/>
+            <a:off x="535618" y="23788194"/>
             <a:ext cx="12949224" cy="643172"/>
           </a:xfrm>
           <a:prstGeom prst="rect">
@@ -11776,15 +11871,7 @@
           <a:p>
             <a:r>
               <a:rPr lang="en-US" b="0" dirty="0" smtClean="0"/>
-              <a:t>Late </a:t>
-            </a:r>
-            <a:r>
-              <a:rPr lang="en-US" b="0" dirty="0" smtClean="0"/>
-              <a:t>Fusion with Attention </a:t>
-            </a:r>
-            <a:r>
-              <a:rPr lang="en-US" b="0" dirty="0" smtClean="0"/>
-              <a:t>- Generative</a:t>
+              <a:t>Late Fusion with Attention - Generative</a:t>
             </a:r>
           </a:p>
         </p:txBody>
@@ -11811,7 +11898,7 @@
         </p:blipFill>
         <p:spPr>
           <a:xfrm>
-            <a:off x="881761" y="19348961"/>
+            <a:off x="881761" y="18438716"/>
             <a:ext cx="12422541" cy="4001933"/>
           </a:xfrm>
           <a:prstGeom prst="rect">
@@ -11841,7 +11928,7 @@
         </p:blipFill>
         <p:spPr>
           <a:xfrm>
-            <a:off x="860154" y="25632421"/>
+            <a:off x="896717" y="24529267"/>
             <a:ext cx="12300154" cy="4353671"/>
           </a:xfrm>
           <a:prstGeom prst="rect">
@@ -11849,6 +11936,80 @@
           </a:prstGeom>
         </p:spPr>
       </p:pic>
+      <p:sp>
+        <p:nvSpPr>
+          <p:cNvPr id="2" name="TextBox 1"/>
+          <p:cNvSpPr txBox="1"/>
+          <p:nvPr/>
+        </p:nvSpPr>
+        <p:spPr>
+          <a:xfrm>
+            <a:off x="1161806" y="15818984"/>
+            <a:ext cx="11862449" cy="1754326"/>
+          </a:xfrm>
+          <a:prstGeom prst="rect">
+            <a:avLst/>
+          </a:prstGeom>
+          <a:noFill/>
+        </p:spPr>
+        <p:txBody>
+          <a:bodyPr wrap="square" rtlCol="0">
+            <a:spAutoFit/>
+          </a:bodyPr>
+          <a:lstStyle/>
+          <a:p>
+            <a:r>
+              <a:rPr lang="en-US" sz="2160" dirty="0" smtClean="0">
+                <a:latin typeface="Times New Roman" panose="02020603050405020304" pitchFamily="18" charset="0"/>
+                <a:cs typeface="Times New Roman" panose="02020603050405020304" pitchFamily="18" charset="0"/>
+              </a:rPr>
+              <a:t>We first decided to use a Late Fusion Discriminative model as the baseline with which we would compare our other models to in terms of performance. This model has an LF Encoder which concatenates the individual representations of the questions and the images, and linearly transforms this input to a desired joint representation of features. The discriminative decoder computes the similarity between the input encoding and the LSTM encoding of the answer options to get an evaluation metric.</a:t>
+            </a:r>
+            <a:endParaRPr lang="en-US" sz="2160" dirty="0" smtClean="0">
+              <a:latin typeface="Times New Roman" panose="02020603050405020304" pitchFamily="18" charset="0"/>
+              <a:cs typeface="Times New Roman" panose="02020603050405020304" pitchFamily="18" charset="0"/>
+            </a:endParaRPr>
+          </a:p>
+        </p:txBody>
+      </p:sp>
+      <p:sp>
+        <p:nvSpPr>
+          <p:cNvPr id="6" name="TextBox 5"/>
+          <p:cNvSpPr txBox="1"/>
+          <p:nvPr/>
+        </p:nvSpPr>
+        <p:spPr>
+          <a:xfrm>
+            <a:off x="1339588" y="28980839"/>
+            <a:ext cx="11506884" cy="2751522"/>
+          </a:xfrm>
+          <a:prstGeom prst="rect">
+            <a:avLst/>
+          </a:prstGeom>
+          <a:noFill/>
+        </p:spPr>
+        <p:txBody>
+          <a:bodyPr wrap="square" rtlCol="0">
+            <a:spAutoFit/>
+          </a:bodyPr>
+          <a:lstStyle/>
+          <a:p>
+            <a:r>
+              <a:rPr lang="en-US" sz="2160" dirty="0">
+                <a:latin typeface="Times New Roman" charset="0"/>
+                <a:ea typeface="Times New Roman" charset="0"/>
+                <a:cs typeface="Times New Roman" charset="0"/>
+              </a:rPr>
+              <a:t>In this part, we implement the generative model with the attention-based word decoder. At every output step, the model produces a probability distribution over the next word conditioned on all the words seen previously. The context vector is produced by an attention mechanism, which comes from question and image. The question is converted with GRU and MLP while the image is segmented first then converted with MLP. With keys and values, and the transformation of encoder features, the contexts can be created. Then we concatenate these two parts and input them along with the hidden vector into the projection to get the final distribution. In the generative process, we just initialize our first and last words as the start index and end index.</a:t>
+            </a:r>
+            <a:endParaRPr lang="en-US" sz="2160" dirty="0" smtClean="0">
+              <a:latin typeface="Times New Roman" charset="0"/>
+              <a:ea typeface="Times New Roman" charset="0"/>
+              <a:cs typeface="Times New Roman" charset="0"/>
+            </a:endParaRPr>
+          </a:p>
+        </p:txBody>
+      </p:sp>
     </p:spTree>
     <p:extLst>
       <p:ext uri="{BB962C8B-B14F-4D97-AF65-F5344CB8AC3E}">

</xml_diff>